<commit_message>
final edit of report and presentation
</commit_message>
<xml_diff>
--- a/report&presentation/presentation.pptx
+++ b/report&presentation/presentation.pptx
@@ -466,6 +466,90 @@
 </file>
 
 <file path=ppt/notesSlides/notesSlide1.xml><?xml version="1.0" encoding="utf-8"?>
+<p:notes xmlns:a="http://schemas.openxmlformats.org/drawingml/2006/main" xmlns:r="http://schemas.openxmlformats.org/officeDocument/2006/relationships" xmlns:p="http://schemas.openxmlformats.org/presentationml/2006/main">
+  <p:cSld>
+    <p:spTree>
+      <p:nvGrpSpPr>
+        <p:cNvPr id="1" name=""/>
+        <p:cNvGrpSpPr/>
+        <p:nvPr/>
+      </p:nvGrpSpPr>
+      <p:grpSpPr>
+        <a:xfrm>
+          <a:off x="0" y="0"/>
+          <a:ext cx="0" cy="0"/>
+          <a:chOff x="0" y="0"/>
+          <a:chExt cx="0" cy="0"/>
+        </a:xfrm>
+      </p:grpSpPr>
+      <p:sp>
+        <p:nvSpPr>
+          <p:cNvPr id="2" name="Slide Image Placeholder 1"/>
+          <p:cNvSpPr>
+            <a:spLocks noGrp="1" noRot="1" noChangeAspect="1"/>
+          </p:cNvSpPr>
+          <p:nvPr>
+            <p:ph type="sldImg"/>
+          </p:nvPr>
+        </p:nvSpPr>
+        <p:spPr/>
+      </p:sp>
+      <p:sp>
+        <p:nvSpPr>
+          <p:cNvPr id="3" name="Notes Placeholder 2"/>
+          <p:cNvSpPr>
+            <a:spLocks noGrp="1"/>
+          </p:cNvSpPr>
+          <p:nvPr>
+            <p:ph type="body" idx="1"/>
+          </p:nvPr>
+        </p:nvSpPr>
+        <p:spPr/>
+        <p:txBody>
+          <a:bodyPr/>
+          <a:lstStyle/>
+          <a:p>
+            <a:endParaRPr lang="en-US" dirty="0"/>
+          </a:p>
+        </p:txBody>
+      </p:sp>
+      <p:sp>
+        <p:nvSpPr>
+          <p:cNvPr id="4" name="Slide Number Placeholder 3"/>
+          <p:cNvSpPr>
+            <a:spLocks noGrp="1"/>
+          </p:cNvSpPr>
+          <p:nvPr>
+            <p:ph type="sldNum" sz="quarter" idx="5"/>
+          </p:nvPr>
+        </p:nvSpPr>
+        <p:spPr/>
+        <p:txBody>
+          <a:bodyPr/>
+          <a:lstStyle/>
+          <a:p>
+            <a:fld id="{7A5D3614-CF85-D742-8AF7-6062B122627F}" type="slidenum">
+              <a:rPr lang="en-US" smtClean="0"/>
+              <a:t>2</a:t>
+            </a:fld>
+            <a:endParaRPr lang="en-US"/>
+          </a:p>
+        </p:txBody>
+      </p:sp>
+    </p:spTree>
+    <p:extLst>
+      <p:ext uri="{BB962C8B-B14F-4D97-AF65-F5344CB8AC3E}">
+        <p14:creationId xmlns:p14="http://schemas.microsoft.com/office/powerpoint/2010/main" val="3145911933"/>
+      </p:ext>
+    </p:extLst>
+  </p:cSld>
+  <p:clrMapOvr>
+    <a:masterClrMapping/>
+  </p:clrMapOvr>
+</p:notes>
+</file>
+
+<file path=ppt/notesSlides/notesSlide2.xml><?xml version="1.0" encoding="utf-8"?>
 <p:notes xmlns:a="http://schemas.openxmlformats.org/drawingml/2006/main" xmlns:r="http://schemas.openxmlformats.org/officeDocument/2006/relationships" xmlns:p="http://schemas.openxmlformats.org/presentationml/2006/main">
   <p:cSld>
     <p:spTree>
@@ -3978,7 +4062,7 @@
     <p:bg>
       <p:bgPr>
         <a:blipFill dpi="0" rotWithShape="1">
-          <a:blip r:embed="rId2">
+          <a:blip r:embed="rId3">
             <a:alphaModFix amt="20000"/>
             <a:lum/>
           </a:blip>
@@ -4032,8 +4116,19 @@
           <a:p>
             <a:r>
               <a:rPr lang="en-US" b="1" dirty="0"/>
-              <a:t>Patient RNA-seq Data</a:t>
-            </a:r>
+              <a:t>Patient RNA-seq Data: </a:t>
+            </a:r>
+            <a:r>
+              <a:rPr lang="en-AU" b="1" dirty="0"/>
+              <a:t>GSE131179</a:t>
+            </a:r>
+            <a:r>
+              <a:rPr lang="en-AU" b="1" dirty="0">
+                <a:effectLst/>
+              </a:rPr>
+              <a:t> </a:t>
+            </a:r>
+            <a:endParaRPr lang="en-US" b="1" dirty="0"/>
           </a:p>
         </p:txBody>
       </p:sp>
@@ -4055,12 +4150,14 @@
         </p:nvSpPr>
         <p:spPr>
           <a:xfrm>
-            <a:off x="3167743" y="1825624"/>
-            <a:ext cx="8186056" cy="4836433"/>
+            <a:off x="3167743" y="1660524"/>
+            <a:ext cx="8274958" cy="5400676"/>
           </a:xfrm>
         </p:spPr>
         <p:txBody>
-          <a:bodyPr/>
+          <a:bodyPr>
+            <a:normAutofit/>
+          </a:bodyPr>
           <a:lstStyle/>
           <a:p>
             <a:r>
@@ -4108,22 +4205,33 @@
             <a:pPr marL="0" indent="0">
               <a:buNone/>
             </a:pPr>
-            <a:endParaRPr lang="en-US" dirty="0"/>
-          </a:p>
-          <a:p>
-            <a:pPr marL="0" indent="0">
-              <a:buNone/>
-            </a:pPr>
             <a:endParaRPr lang="en-US" sz="1800" dirty="0"/>
           </a:p>
           <a:p>
-            <a:pPr marL="0" indent="0">
+            <a:pPr marL="0" indent="0" algn="r">
               <a:buNone/>
             </a:pPr>
             <a:r>
               <a:rPr lang="en-US" sz="1800" dirty="0"/>
               <a:t>Table 1: A preview of training dataset</a:t>
             </a:r>
+          </a:p>
+          <a:p>
+            <a:r>
+              <a:rPr lang="en-US" dirty="0"/>
+              <a:t>Outcome: </a:t>
+            </a:r>
+            <a:r>
+              <a:rPr lang="en-AU" dirty="0"/>
+              <a:t>Acute Cellular Rejection or Normal/Non-Specific</a:t>
+            </a:r>
+            <a:r>
+              <a:rPr lang="en-AU" dirty="0">
+                <a:effectLst/>
+              </a:rPr>
+              <a:t> </a:t>
+            </a:r>
+            <a:endParaRPr lang="en-US" dirty="0"/>
           </a:p>
         </p:txBody>
       </p:sp>
@@ -4197,14 +4305,14 @@
           <p:nvPr/>
         </p:nvPicPr>
         <p:blipFill>
-          <a:blip r:embed="rId3"/>
+          <a:blip r:embed="rId4"/>
           <a:stretch>
             <a:fillRect/>
           </a:stretch>
         </p:blipFill>
         <p:spPr>
           <a:xfrm>
-            <a:off x="3167741" y="3139447"/>
+            <a:off x="3167742" y="2607896"/>
             <a:ext cx="8186057" cy="3068687"/>
           </a:xfrm>
           <a:prstGeom prst="rect">

</xml_diff>